<commit_message>
Updated minor grammar issues
</commit_message>
<xml_diff>
--- a/Subgroups/ASX/Status Reporting/2026 SIW C2SIM ASX Update.pptx
+++ b/Subgroups/ASX/Status Reporting/2026 SIW C2SIM ASX Update.pptx
@@ -395,7 +395,7 @@
                 </a:solidFill>
                 <a:latin typeface="Red Hat Display" panose="02010303040201060303" pitchFamily="2" charset="0"/>
               </a:rPr>
-              <a:t>2026-02-04</a:t>
+              <a:t>2026-02-11</a:t>
             </a:fld>
             <a:endParaRPr lang="en-CA">
               <a:solidFill>
@@ -603,7 +603,7 @@
             <a:fld id="{862401FA-03E4-417E-850D-BECBAC0BE149}" type="datetimeFigureOut">
               <a:rPr lang="en-CA" smtClean="0"/>
               <a:pPr/>
-              <a:t>2026-02-04</a:t>
+              <a:t>2026-02-11</a:t>
             </a:fld>
             <a:endParaRPr lang="en-CA"/>
           </a:p>
@@ -1573,7 +1573,7 @@
           <a:p>
             <a:fld id="{A99DE38A-F523-4625-AD04-A26CD6F4D124}" type="datetimeFigureOut">
               <a:rPr lang="en-CA" smtClean="0"/>
-              <a:t>2026-02-04</a:t>
+              <a:t>2026-02-11</a:t>
             </a:fld>
             <a:endParaRPr lang="en-CA"/>
           </a:p>
@@ -1886,7 +1886,7 @@
           <a:p>
             <a:fld id="{A99DE38A-F523-4625-AD04-A26CD6F4D124}" type="datetimeFigureOut">
               <a:rPr lang="en-CA" smtClean="0"/>
-              <a:t>2026-02-04</a:t>
+              <a:t>2026-02-11</a:t>
             </a:fld>
             <a:endParaRPr lang="en-CA"/>
           </a:p>
@@ -2110,7 +2110,7 @@
           <a:p>
             <a:fld id="{A99DE38A-F523-4625-AD04-A26CD6F4D124}" type="datetimeFigureOut">
               <a:rPr lang="en-CA" smtClean="0"/>
-              <a:t>2026-02-04</a:t>
+              <a:t>2026-02-11</a:t>
             </a:fld>
             <a:endParaRPr lang="en-CA"/>
           </a:p>
@@ -4838,17 +4838,17 @@
           </a:ln>
           <a:extLst>
             <a:ext uri="{FAA26D3D-D897-4be2-8F04-BA451C77F1D7}">
-              <ma14:placeholderFlag xmlns="" xmlns:a14="http://schemas.microsoft.com/office/drawing/2010/main" xmlns:a16="http://schemas.microsoft.com/office/drawing/2014/main" xmlns:asvg="http://schemas.microsoft.com/office/drawing/2016/SVG/main" xmlns:p14="http://schemas.microsoft.com/office/powerpoint/2010/main" xmlns:p15="http://schemas.microsoft.com/office/powerpoint/2012/main" xmlns:ma14="http://schemas.microsoft.com/office/mac/drawingml/2011/main" val="1"/>
+              <ma14:placeholderFlag xmlns:ma14="http://schemas.microsoft.com/office/mac/drawingml/2011/main" xmlns:p15="http://schemas.microsoft.com/office/powerpoint/2012/main" xmlns:p14="http://schemas.microsoft.com/office/powerpoint/2010/main" xmlns:asvg="http://schemas.microsoft.com/office/drawing/2016/SVG/main" xmlns:a16="http://schemas.microsoft.com/office/drawing/2014/main" xmlns:a14="http://schemas.microsoft.com/office/drawing/2010/main" xmlns="" val="1"/>
             </a:ext>
             <a:ext uri="{909E8E84-426E-40dd-AFC4-6F175D3DCCD1}">
-              <a14:hiddenFill xmlns="" xmlns:ma14="http://schemas.microsoft.com/office/mac/drawingml/2011/main" xmlns:a16="http://schemas.microsoft.com/office/drawing/2014/main" xmlns:asvg="http://schemas.microsoft.com/office/drawing/2016/SVG/main" xmlns:p14="http://schemas.microsoft.com/office/powerpoint/2010/main" xmlns:p15="http://schemas.microsoft.com/office/powerpoint/2012/main" xmlns:a14="http://schemas.microsoft.com/office/drawing/2010/main">
+              <a14:hiddenFill xmlns:a14="http://schemas.microsoft.com/office/drawing/2010/main" xmlns:p15="http://schemas.microsoft.com/office/powerpoint/2012/main" xmlns:p14="http://schemas.microsoft.com/office/powerpoint/2010/main" xmlns:asvg="http://schemas.microsoft.com/office/drawing/2016/SVG/main" xmlns:a16="http://schemas.microsoft.com/office/drawing/2014/main" xmlns:ma14="http://schemas.microsoft.com/office/mac/drawingml/2011/main" xmlns="">
                 <a:solidFill>
                   <a:srgbClr val="FFFFFF"/>
                 </a:solidFill>
               </a14:hiddenFill>
             </a:ext>
             <a:ext uri="{91240B29-F687-4f45-9708-019B960494DF}">
-              <a14:hiddenLine xmlns="" xmlns:ma14="http://schemas.microsoft.com/office/mac/drawingml/2011/main" xmlns:a16="http://schemas.microsoft.com/office/drawing/2014/main" xmlns:asvg="http://schemas.microsoft.com/office/drawing/2016/SVG/main" xmlns:p14="http://schemas.microsoft.com/office/powerpoint/2010/main" xmlns:p15="http://schemas.microsoft.com/office/powerpoint/2012/main" xmlns:a14="http://schemas.microsoft.com/office/drawing/2010/main" w="9525">
+              <a14:hiddenLine xmlns:a14="http://schemas.microsoft.com/office/drawing/2010/main" xmlns:p15="http://schemas.microsoft.com/office/powerpoint/2012/main" xmlns:p14="http://schemas.microsoft.com/office/powerpoint/2010/main" xmlns:asvg="http://schemas.microsoft.com/office/drawing/2016/SVG/main" xmlns:a16="http://schemas.microsoft.com/office/drawing/2014/main" xmlns:ma14="http://schemas.microsoft.com/office/mac/drawingml/2011/main" xmlns="" w="9525">
                 <a:solidFill>
                   <a:srgbClr val="000000"/>
                 </a:solidFill>
@@ -7310,7 +7310,7 @@
             <a:pPr lvl="1"/>
             <a:r>
               <a:rPr lang="en-US" dirty="0"/>
-              <a:t>Order, Command, Report Messages.</a:t>
+              <a:t>Order, Report Messages.</a:t>
             </a:r>
           </a:p>
           <a:p>
@@ -7444,7 +7444,7 @@
           <a:p>
             <a:r>
               <a:rPr lang="en-US" dirty="0"/>
-              <a:t>Entities that cannot be specified with existing values are highlighted. </a:t>
+              <a:t>Concepts that cannot be specified with existing values are highlighted. </a:t>
             </a:r>
           </a:p>
           <a:p>
@@ -7760,14 +7760,14 @@
           <p:nvPr>
             <p:extLst>
               <p:ext uri="{D42A27DB-BD31-4B8C-83A1-F6EECF244321}">
-                <p14:modId xmlns:p14="http://schemas.microsoft.com/office/powerpoint/2010/main" val="4263126027"/>
+                <p14:modId xmlns:p14="http://schemas.microsoft.com/office/powerpoint/2010/main" val="3081074660"/>
               </p:ext>
             </p:extLst>
           </p:nvPr>
         </p:nvGraphicFramePr>
         <p:xfrm>
           <a:off x="1064871" y="1940560"/>
-          <a:ext cx="9704728" cy="3058593"/>
+          <a:ext cx="9704728" cy="2760236"/>
         </p:xfrm>
         <a:graphic>
           <a:graphicData uri="http://schemas.openxmlformats.org/drawingml/2006/table">
@@ -8439,7 +8439,7 @@
                       <a:pPr algn="l" fontAlgn="b">
                         <a:buNone/>
                       </a:pPr>
-                      <a:endParaRPr lang="en-CA" sz="1800" b="1" i="0" u="none" strike="noStrike">
+                      <a:endParaRPr lang="en-CA" sz="1800" b="1" i="0" u="none" strike="noStrike" dirty="0">
                         <a:solidFill>
                           <a:srgbClr val="000000"/>
                         </a:solidFill>
@@ -8554,10 +8554,35 @@
                         <a:buNone/>
                       </a:pPr>
                       <a:r>
+                        <a:rPr lang="en-CA" sz="1800" u="none" strike="noStrike" dirty="0">
+                          <a:effectLst/>
+                        </a:rPr>
+                        <a:t>C2SIM</a:t>
+                      </a:r>
+                      <a:endParaRPr lang="en-CA" sz="1800" b="1" i="0" u="none" strike="noStrike" dirty="0">
+                        <a:solidFill>
+                          <a:srgbClr val="000000"/>
+                        </a:solidFill>
+                        <a:effectLst/>
+                        <a:latin typeface="Aptos Narrow" panose="020B0004020202020204" pitchFamily="34" charset="0"/>
+                      </a:endParaRPr>
+                    </a:p>
+                  </a:txBody>
+                  <a:tcPr marL="7620" marR="7620" marT="7620" marB="0" anchor="b"/>
+                </a:tc>
+                <a:tc>
+                  <a:txBody>
+                    <a:bodyPr/>
+                    <a:lstStyle/>
+                    <a:p>
+                      <a:pPr algn="l" fontAlgn="b">
+                        <a:buNone/>
+                      </a:pPr>
+                      <a:r>
                         <a:rPr lang="en-CA" sz="1800" u="none" strike="noStrike">
                           <a:effectLst/>
                         </a:rPr>
-                        <a:t>C2SIM</a:t>
+                        <a:t>ReportBody</a:t>
                       </a:r>
                       <a:endParaRPr lang="en-CA" sz="1800" b="1" i="0" u="none" strike="noStrike">
                         <a:solidFill>
@@ -8603,145 +8628,6 @@
                       <a:pPr algn="l" fontAlgn="b">
                         <a:buNone/>
                       </a:pPr>
-                      <a:endParaRPr lang="en-CA" sz="1800" b="1" i="0" u="none" strike="noStrike">
-                        <a:solidFill>
-                          <a:srgbClr val="000000"/>
-                        </a:solidFill>
-                        <a:effectLst/>
-                        <a:latin typeface="Aptos Narrow" panose="020B0004020202020204" pitchFamily="34" charset="0"/>
-                      </a:endParaRPr>
-                    </a:p>
-                  </a:txBody>
-                  <a:tcPr marL="7620" marR="7620" marT="7620" marB="0" anchor="b"/>
-                </a:tc>
-                <a:tc>
-                  <a:txBody>
-                    <a:bodyPr/>
-                    <a:lstStyle/>
-                    <a:p>
-                      <a:pPr algn="l" fontAlgn="b">
-                        <a:buNone/>
-                      </a:pPr>
-                      <a:endParaRPr lang="en-CA" sz="1800" b="0" i="0" u="none" strike="noStrike">
-                        <a:solidFill>
-                          <a:srgbClr val="000000"/>
-                        </a:solidFill>
-                        <a:effectLst/>
-                        <a:latin typeface="Aptos Narrow" panose="020B0004020202020204" pitchFamily="34" charset="0"/>
-                      </a:endParaRPr>
-                    </a:p>
-                  </a:txBody>
-                  <a:tcPr marL="7620" marR="7620" marT="7620" marB="0" anchor="b"/>
-                </a:tc>
-                <a:tc>
-                  <a:txBody>
-                    <a:bodyPr/>
-                    <a:lstStyle/>
-                    <a:p>
-                      <a:pPr algn="l" fontAlgn="b">
-                        <a:buNone/>
-                      </a:pPr>
-                      <a:endParaRPr lang="en-CA" sz="1800" b="0" i="0" u="none" strike="noStrike">
-                        <a:solidFill>
-                          <a:srgbClr val="000000"/>
-                        </a:solidFill>
-                        <a:effectLst/>
-                        <a:latin typeface="Aptos Narrow" panose="020B0004020202020204" pitchFamily="34" charset="0"/>
-                      </a:endParaRPr>
-                    </a:p>
-                  </a:txBody>
-                  <a:tcPr marL="7620" marR="7620" marT="7620" marB="0" anchor="b"/>
-                </a:tc>
-                <a:extLst>
-                  <a:ext uri="{0D108BD9-81ED-4DB2-BD59-A6C34878D82A}">
-                    <a16:rowId xmlns:a16="http://schemas.microsoft.com/office/drawing/2014/main" val="206454885"/>
-                  </a:ext>
-                </a:extLst>
-              </a:tr>
-              <a:tr h="298357">
-                <a:tc>
-                  <a:txBody>
-                    <a:bodyPr/>
-                    <a:lstStyle/>
-                    <a:p>
-                      <a:pPr algn="l" fontAlgn="b">
-                        <a:buNone/>
-                      </a:pPr>
-                      <a:r>
-                        <a:rPr lang="en-CA" sz="1800" u="none" strike="noStrike">
-                          <a:effectLst/>
-                        </a:rPr>
-                        <a:t>C2SIM</a:t>
-                      </a:r>
-                      <a:endParaRPr lang="en-CA" sz="1800" b="1" i="0" u="none" strike="noStrike">
-                        <a:solidFill>
-                          <a:srgbClr val="000000"/>
-                        </a:solidFill>
-                        <a:effectLst/>
-                        <a:latin typeface="Aptos Narrow" panose="020B0004020202020204" pitchFamily="34" charset="0"/>
-                      </a:endParaRPr>
-                    </a:p>
-                  </a:txBody>
-                  <a:tcPr marL="7620" marR="7620" marT="7620" marB="0" anchor="b"/>
-                </a:tc>
-                <a:tc>
-                  <a:txBody>
-                    <a:bodyPr/>
-                    <a:lstStyle/>
-                    <a:p>
-                      <a:pPr algn="l" fontAlgn="b">
-                        <a:buNone/>
-                      </a:pPr>
-                      <a:r>
-                        <a:rPr lang="en-CA" sz="1800" u="none" strike="noStrike">
-                          <a:effectLst/>
-                        </a:rPr>
-                        <a:t>ReportBody</a:t>
-                      </a:r>
-                      <a:endParaRPr lang="en-CA" sz="1800" b="1" i="0" u="none" strike="noStrike">
-                        <a:solidFill>
-                          <a:srgbClr val="000000"/>
-                        </a:solidFill>
-                        <a:effectLst/>
-                        <a:latin typeface="Aptos Narrow" panose="020B0004020202020204" pitchFamily="34" charset="0"/>
-                      </a:endParaRPr>
-                    </a:p>
-                  </a:txBody>
-                  <a:tcPr marL="7620" marR="7620" marT="7620" marB="0" anchor="b"/>
-                </a:tc>
-                <a:tc>
-                  <a:txBody>
-                    <a:bodyPr/>
-                    <a:lstStyle/>
-                    <a:p>
-                      <a:pPr algn="l" fontAlgn="b">
-                        <a:buNone/>
-                      </a:pPr>
-                      <a:r>
-                        <a:rPr lang="en-CA" sz="1800" u="none" strike="noStrike">
-                          <a:effectLst/>
-                        </a:rPr>
-                        <a:t>DomainMessageBody</a:t>
-                      </a:r>
-                      <a:endParaRPr lang="en-CA" sz="1800" b="1" i="0" u="none" strike="noStrike">
-                        <a:solidFill>
-                          <a:srgbClr val="000000"/>
-                        </a:solidFill>
-                        <a:effectLst/>
-                        <a:latin typeface="Aptos Narrow" panose="020B0004020202020204" pitchFamily="34" charset="0"/>
-                      </a:endParaRPr>
-                    </a:p>
-                  </a:txBody>
-                  <a:tcPr marL="7620" marR="7620" marT="7620" marB="0" anchor="b"/>
-                </a:tc>
-                <a:tc>
-                  <a:txBody>
-                    <a:bodyPr/>
-                    <a:lstStyle/>
-                    <a:p>
-                      <a:pPr algn="l" fontAlgn="b">
-                        <a:buNone/>
-                      </a:pPr>
                       <a:r>
                         <a:rPr lang="en-CA" sz="1800" u="none" strike="noStrike">
                           <a:effectLst/>
@@ -8767,7 +8653,7 @@
                       <a:pPr algn="l" fontAlgn="b">
                         <a:buNone/>
                       </a:pPr>
-                      <a:endParaRPr lang="en-CA" sz="1800" b="0" i="0" u="none" strike="noStrike">
+                      <a:endParaRPr lang="en-CA" sz="1800" b="0" i="0" u="none" strike="noStrike" dirty="0">
                         <a:solidFill>
                           <a:srgbClr val="000000"/>
                         </a:solidFill>
@@ -9084,7 +8970,7 @@
           <p:nvPr>
             <p:extLst>
               <p:ext uri="{D42A27DB-BD31-4B8C-83A1-F6EECF244321}">
-                <p14:modId xmlns:p14="http://schemas.microsoft.com/office/powerpoint/2010/main" val="1142737020"/>
+                <p14:modId xmlns:p14="http://schemas.microsoft.com/office/powerpoint/2010/main" val="2810028559"/>
               </p:ext>
             </p:extLst>
           </p:nvPr>
@@ -9979,16 +9865,10 @@
                         <a:buNone/>
                       </a:pPr>
                       <a:r>
-                        <a:rPr lang="en-CA" sz="1400" u="none" strike="noStrike" dirty="0" err="1">
-                          <a:effectLst/>
-                        </a:rPr>
-                        <a:t>Sensors's</a:t>
-                      </a:r>
-                      <a:r>
                         <a:rPr lang="en-CA" sz="1400" u="none" strike="noStrike" dirty="0">
                           <a:effectLst/>
                         </a:rPr>
-                        <a:t>  location</a:t>
+                        <a:t>Sensor's  location</a:t>
                       </a:r>
                       <a:endParaRPr lang="en-CA" sz="1400" b="0" i="0" u="none" strike="noStrike" dirty="0">
                         <a:solidFill>
@@ -11383,7 +11263,7 @@
                       <a:pPr algn="l" fontAlgn="b">
                         <a:buNone/>
                       </a:pPr>
-                      <a:endParaRPr lang="en-CA" sz="1400" b="0" i="0" u="none" strike="noStrike">
+                      <a:endParaRPr lang="en-CA" sz="1400" b="0" i="0" u="none" strike="noStrike" dirty="0">
                         <a:solidFill>
                           <a:srgbClr val="000000"/>
                         </a:solidFill>
@@ -12371,12 +12251,12 @@
                         <a:buNone/>
                       </a:pPr>
                       <a:r>
-                        <a:rPr lang="en-CA" sz="1400" u="none" strike="noStrike">
+                        <a:rPr lang="en-CA" sz="1400" u="none" strike="noStrike" dirty="0" err="1">
                           <a:effectLst/>
                         </a:rPr>
                         <a:t>MediaReference</a:t>
                       </a:r>
-                      <a:endParaRPr lang="en-CA" sz="1400" b="1" i="0" u="none" strike="noStrike">
+                      <a:endParaRPr lang="en-CA" sz="1400" b="1" i="0" u="none" strike="noStrike" dirty="0">
                         <a:solidFill>
                           <a:srgbClr val="000000"/>
                         </a:solidFill>
@@ -12655,7 +12535,7 @@
                       <a:pPr algn="l" fontAlgn="b">
                         <a:buNone/>
                       </a:pPr>
-                      <a:endParaRPr lang="en-CA" sz="1400" b="0" i="0" u="none" strike="noStrike">
+                      <a:endParaRPr lang="en-CA" sz="1400" b="0" i="0" u="none" strike="noStrike" dirty="0">
                         <a:solidFill>
                           <a:srgbClr val="000000"/>
                         </a:solidFill>
@@ -16056,6 +15936,43 @@
               <a:rPr lang="en-US" dirty="0"/>
               <a:t>Identifying entities from Use Cases</a:t>
             </a:r>
+          </a:p>
+          <a:p>
+            <a:endParaRPr lang="en-US" dirty="0"/>
+          </a:p>
+          <a:p>
+            <a:pPr lvl="1"/>
+            <a:r>
+              <a:rPr lang="en-US" dirty="0"/>
+              <a:t>Note: All presentations and working documents are available from GitHub under </a:t>
+            </a:r>
+            <a:r>
+              <a:rPr lang="en-CA" dirty="0">
+                <a:hlinkClick r:id="rId2"/>
+              </a:rPr>
+              <a:t>GitHub - </a:t>
+            </a:r>
+            <a:r>
+              <a:rPr lang="en-CA" dirty="0" err="1">
+                <a:hlinkClick r:id="rId2"/>
+              </a:rPr>
+              <a:t>hyssostech</a:t>
+            </a:r>
+            <a:r>
+              <a:rPr lang="en-CA" dirty="0">
+                <a:hlinkClick r:id="rId2"/>
+              </a:rPr>
+              <a:t>/C2SIMArtifacts: C2SIM Artifacts</a:t>
+            </a:r>
+            <a:endParaRPr lang="en-CA" dirty="0"/>
+          </a:p>
+          <a:p>
+            <a:pPr lvl="2"/>
+            <a:r>
+              <a:rPr lang="en-CA" dirty="0"/>
+              <a:t>See the Subgroups / ASX folder.</a:t>
+            </a:r>
+            <a:endParaRPr lang="en-US" dirty="0"/>
           </a:p>
         </p:txBody>
       </p:sp>
@@ -18339,40 +18256,6 @@
 </file>
 
 <file path=customXml/item1.xml><?xml version="1.0" encoding="utf-8"?>
-<p:properties xmlns:p="http://schemas.microsoft.com/office/2006/metadata/properties" xmlns:xsi="http://www.w3.org/2001/XMLSchema-instance" xmlns:pc="http://schemas.microsoft.com/office/infopath/2007/PartnerControls">
-  <documentManagement>
-    <SharedWithUsers xmlns="716d1e58-2f47-4028-a3d3-4ae2fbcdb48c">
-      <UserInfo>
-        <DisplayName>SharingLinks.3e3d083d-97f8-426a-ad2b-91c3f471e3c9.OrganizationEdit.06e789e9-29fd-41f8-9fa1-705ae9007a95</DisplayName>
-        <AccountId>24</AccountId>
-        <AccountType/>
-      </UserInfo>
-      <UserInfo>
-        <DisplayName>SharingLinks.f39469b9-5b0e-416a-ba7b-bcaccd1af0d5.OrganizationEdit.e01e0804-14a8-468e-9836-48909cdb4ae1</DisplayName>
-        <AccountId>36</AccountId>
-        <AccountType/>
-      </UserInfo>
-      <UserInfo>
-        <DisplayName>Sylvia Mutter</DisplayName>
-        <AccountId>43</AccountId>
-        <AccountType/>
-      </UserInfo>
-      <UserInfo>
-        <DisplayName>Aline Massouh</DisplayName>
-        <AccountId>9031</AccountId>
-        <AccountType/>
-      </UserInfo>
-    </SharedWithUsers>
-    <lcf76f155ced4ddcb4097134ff3c332f xmlns="9de35825-77e6-4d9d-bbc7-7a2b5e5c6d68">
-      <Terms xmlns="http://schemas.microsoft.com/office/infopath/2007/PartnerControls"/>
-    </lcf76f155ced4ddcb4097134ff3c332f>
-    <TaxCatchAll xmlns="12cd23af-3e52-4056-a2c9-5961a2704e29" xsi:nil="true"/>
-    <MediaLengthInSeconds xmlns="9de35825-77e6-4d9d-bbc7-7a2b5e5c6d68" xsi:nil="true"/>
-  </documentManagement>
-</p:properties>
-</file>
-
-<file path=customXml/item2.xml><?xml version="1.0" encoding="utf-8"?>
 <ct:contentTypeSchema xmlns:ct="http://schemas.microsoft.com/office/2006/metadata/contentType" xmlns:ma="http://schemas.microsoft.com/office/2006/metadata/properties/metaAttributes" ct:_="" ma:_="" ma:contentTypeName="Document" ma:contentTypeID="0x01010027EE6BE8E9D62A489E89088165552537" ma:contentTypeVersion="23" ma:contentTypeDescription="Create a new document." ma:contentTypeScope="" ma:versionID="6e83425ab1c525ba8fce5c619b58b1dc">
   <xsd:schema xmlns:xsd="http://www.w3.org/2001/XMLSchema" xmlns:xs="http://www.w3.org/2001/XMLSchema" xmlns:p="http://schemas.microsoft.com/office/2006/metadata/properties" xmlns:ns2="9de35825-77e6-4d9d-bbc7-7a2b5e5c6d68" xmlns:ns3="12cd23af-3e52-4056-a2c9-5961a2704e29" xmlns:ns4="716d1e58-2f47-4028-a3d3-4ae2fbcdb48c" targetNamespace="http://schemas.microsoft.com/office/2006/metadata/properties" ma:root="true" ma:fieldsID="23aa16b45e4256d0f85adf32c85bedd2" ns2:_="" ns3:_="" ns4:_="">
     <xsd:import namespace="9de35825-77e6-4d9d-bbc7-7a2b5e5c6d68"/>
@@ -18632,6 +18515,40 @@
 </ct:contentTypeSchema>
 </file>
 
+<file path=customXml/item2.xml><?xml version="1.0" encoding="utf-8"?>
+<p:properties xmlns:p="http://schemas.microsoft.com/office/2006/metadata/properties" xmlns:xsi="http://www.w3.org/2001/XMLSchema-instance" xmlns:pc="http://schemas.microsoft.com/office/infopath/2007/PartnerControls">
+  <documentManagement>
+    <SharedWithUsers xmlns="716d1e58-2f47-4028-a3d3-4ae2fbcdb48c">
+      <UserInfo>
+        <DisplayName>SharingLinks.3e3d083d-97f8-426a-ad2b-91c3f471e3c9.OrganizationEdit.06e789e9-29fd-41f8-9fa1-705ae9007a95</DisplayName>
+        <AccountId>24</AccountId>
+        <AccountType/>
+      </UserInfo>
+      <UserInfo>
+        <DisplayName>SharingLinks.f39469b9-5b0e-416a-ba7b-bcaccd1af0d5.OrganizationEdit.e01e0804-14a8-468e-9836-48909cdb4ae1</DisplayName>
+        <AccountId>36</AccountId>
+        <AccountType/>
+      </UserInfo>
+      <UserInfo>
+        <DisplayName>Sylvia Mutter</DisplayName>
+        <AccountId>43</AccountId>
+        <AccountType/>
+      </UserInfo>
+      <UserInfo>
+        <DisplayName>Aline Massouh</DisplayName>
+        <AccountId>9031</AccountId>
+        <AccountType/>
+      </UserInfo>
+    </SharedWithUsers>
+    <lcf76f155ced4ddcb4097134ff3c332f xmlns="9de35825-77e6-4d9d-bbc7-7a2b5e5c6d68">
+      <Terms xmlns="http://schemas.microsoft.com/office/infopath/2007/PartnerControls"/>
+    </lcf76f155ced4ddcb4097134ff3c332f>
+    <TaxCatchAll xmlns="12cd23af-3e52-4056-a2c9-5961a2704e29" xsi:nil="true"/>
+    <MediaLengthInSeconds xmlns="9de35825-77e6-4d9d-bbc7-7a2b5e5c6d68" xsi:nil="true"/>
+  </documentManagement>
+</p:properties>
+</file>
+
 <file path=customXml/item3.xml><?xml version="1.0" encoding="utf-8"?>
 <?mso-contentType ?>
 <FormTemplates xmlns="http://schemas.microsoft.com/sharepoint/v3/contenttype/forms">
@@ -18642,24 +18559,6 @@
 </file>
 
 <file path=customXml/itemProps1.xml><?xml version="1.0" encoding="utf-8"?>
-<ds:datastoreItem xmlns:ds="http://schemas.openxmlformats.org/officeDocument/2006/customXml" ds:itemID="{A891A0FF-7CF6-4FC6-83D5-1298EC075798}">
-  <ds:schemaRefs>
-    <ds:schemaRef ds:uri="12cd23af-3e52-4056-a2c9-5961a2704e29"/>
-    <ds:schemaRef ds:uri="716d1e58-2f47-4028-a3d3-4ae2fbcdb48c"/>
-    <ds:schemaRef ds:uri="9de35825-77e6-4d9d-bbc7-7a2b5e5c6d68"/>
-    <ds:schemaRef ds:uri="http://purl.org/dc/dcmitype/"/>
-    <ds:schemaRef ds:uri="http://purl.org/dc/elements/1.1/"/>
-    <ds:schemaRef ds:uri="http://purl.org/dc/terms/"/>
-    <ds:schemaRef ds:uri="http://schemas.microsoft.com/office/2006/documentManagement/types"/>
-    <ds:schemaRef ds:uri="http://schemas.microsoft.com/office/2006/metadata/properties"/>
-    <ds:schemaRef ds:uri="http://schemas.microsoft.com/office/infopath/2007/PartnerControls"/>
-    <ds:schemaRef ds:uri="http://schemas.openxmlformats.org/package/2006/metadata/core-properties"/>
-    <ds:schemaRef ds:uri="http://www.w3.org/XML/1998/namespace"/>
-  </ds:schemaRefs>
-</ds:datastoreItem>
-</file>
-
-<file path=customXml/itemProps2.xml><?xml version="1.0" encoding="utf-8"?>
 <ds:datastoreItem xmlns:ds="http://schemas.openxmlformats.org/officeDocument/2006/customXml" ds:itemID="{2CBF9799-0721-4C37-841B-72253AFD53B4}">
   <ds:schemaRefs>
     <ds:schemaRef ds:uri="http://schemas.microsoft.com/office/2006/metadata/contentType"/>
@@ -18679,6 +18578,24 @@
 </ds:datastoreItem>
 </file>
 
+<file path=customXml/itemProps2.xml><?xml version="1.0" encoding="utf-8"?>
+<ds:datastoreItem xmlns:ds="http://schemas.openxmlformats.org/officeDocument/2006/customXml" ds:itemID="{A891A0FF-7CF6-4FC6-83D5-1298EC075798}">
+  <ds:schemaRefs>
+    <ds:schemaRef ds:uri="12cd23af-3e52-4056-a2c9-5961a2704e29"/>
+    <ds:schemaRef ds:uri="716d1e58-2f47-4028-a3d3-4ae2fbcdb48c"/>
+    <ds:schemaRef ds:uri="9de35825-77e6-4d9d-bbc7-7a2b5e5c6d68"/>
+    <ds:schemaRef ds:uri="http://purl.org/dc/dcmitype/"/>
+    <ds:schemaRef ds:uri="http://purl.org/dc/elements/1.1/"/>
+    <ds:schemaRef ds:uri="http://purl.org/dc/terms/"/>
+    <ds:schemaRef ds:uri="http://schemas.microsoft.com/office/2006/documentManagement/types"/>
+    <ds:schemaRef ds:uri="http://schemas.microsoft.com/office/2006/metadata/properties"/>
+    <ds:schemaRef ds:uri="http://schemas.microsoft.com/office/infopath/2007/PartnerControls"/>
+    <ds:schemaRef ds:uri="http://schemas.openxmlformats.org/package/2006/metadata/core-properties"/>
+    <ds:schemaRef ds:uri="http://www.w3.org/XML/1998/namespace"/>
+  </ds:schemaRefs>
+</ds:datastoreItem>
+</file>
+
 <file path=customXml/itemProps3.xml><?xml version="1.0" encoding="utf-8"?>
 <ds:datastoreItem xmlns:ds="http://schemas.openxmlformats.org/officeDocument/2006/customXml" ds:itemID="{E37F82A6-C5BB-4E86-A9B2-E9D69C07338F}">
   <ds:schemaRefs>

</xml_diff>